<commit_message>
Continuing work on week 6 project
</commit_message>
<xml_diff>
--- a/Week_4/Lectures/4.3_Flask_Part_2.pptx
+++ b/Week_4/Lectures/4.3_Flask_Part_2.pptx
@@ -388,7 +388,7 @@
     </p:spTree>
     <p:extLst>
       <p:ext uri="{BB962C8B-B14F-4D97-AF65-F5344CB8AC3E}">
-        <p14:creationId xmlns:p14="http://schemas.microsoft.com/office/powerpoint/2010/main" val="1736051429"/>
+        <p14:creationId xmlns:p14="http://schemas.microsoft.com/office/powerpoint/2010/main" val="594248413"/>
       </p:ext>
     </p:extLst>
   </p:cSld>
@@ -5845,21 +5845,16 @@
             </a:r>
           </a:p>
           <a:p>
-            <a:pPr marL="971550" lvl="1" indent="-285750" rtl="0">
+            <a:pPr marL="914400" lvl="1" indent="-228600" rtl="0">
               <a:spcBef>
                 <a:spcPts val="0"/>
               </a:spcBef>
               <a:spcAft>
                 <a:spcPts val="0"/>
               </a:spcAft>
-              <a:buFont typeface="Arial"/>
-              <a:buChar char="•"/>
-            </a:pPr>
-            <a:r>
-              <a:rPr lang="en" dirty="0">
-                <a:latin typeface="Consolas"/>
-                <a:cs typeface="Consolas"/>
-              </a:rPr>
+            </a:pPr>
+            <a:r>
+              <a:rPr lang="en" dirty="0"/>
               <a:t>@app.route('/hello')			</a:t>
             </a:r>
             <a:r>
@@ -5867,8 +5862,6 @@
                 <a:solidFill>
                   <a:srgbClr val="999999"/>
                 </a:solidFill>
-                <a:latin typeface="Consolas"/>
-                <a:cs typeface="Consolas"/>
               </a:rPr>
               <a:t># </a:t>
             </a:r>
@@ -5877,28 +5870,21 @@
                 <a:solidFill>
                   <a:srgbClr val="999999"/>
                 </a:solidFill>
-                <a:latin typeface="Consolas"/>
-                <a:cs typeface="Consolas"/>
               </a:rPr>
               <a:t>defaults to GET</a:t>
             </a:r>
           </a:p>
           <a:p>
-            <a:pPr marL="971550" lvl="1" indent="-285750" rtl="0">
+            <a:pPr marL="914400" lvl="1" indent="-228600" rtl="0">
               <a:spcBef>
                 <a:spcPts val="0"/>
               </a:spcBef>
               <a:spcAft>
                 <a:spcPts val="0"/>
               </a:spcAft>
-              <a:buFont typeface="Arial"/>
-              <a:buChar char="•"/>
-            </a:pPr>
-            <a:r>
-              <a:rPr lang="en" dirty="0">
-                <a:latin typeface="Consolas"/>
-                <a:cs typeface="Consolas"/>
-              </a:rPr>
+            </a:pPr>
+            <a:r>
+              <a:rPr lang="en" dirty="0"/>
               <a:t>@app.route('/user/bob', methods=['GET'])	</a:t>
             </a:r>
             <a:r>
@@ -5906,8 +5892,6 @@
                 <a:solidFill>
                   <a:srgbClr val="999999"/>
                 </a:solidFill>
-                <a:latin typeface="Consolas"/>
-                <a:cs typeface="Consolas"/>
               </a:rPr>
               <a:t># </a:t>
             </a:r>
@@ -5916,28 +5900,21 @@
                 <a:solidFill>
                   <a:srgbClr val="999999"/>
                 </a:solidFill>
-                <a:latin typeface="Consolas"/>
-                <a:cs typeface="Consolas"/>
               </a:rPr>
               <a:t>supports GET only</a:t>
             </a:r>
           </a:p>
           <a:p>
-            <a:pPr marL="971550" lvl="1" indent="-285750" rtl="0">
+            <a:pPr marL="914400" lvl="1" indent="-228600" rtl="0">
               <a:spcBef>
                 <a:spcPts val="0"/>
               </a:spcBef>
               <a:spcAft>
                 <a:spcPts val="0"/>
               </a:spcAft>
-              <a:buFont typeface="Arial"/>
-              <a:buChar char="•"/>
-            </a:pPr>
-            <a:r>
-              <a:rPr lang="en" dirty="0">
-                <a:latin typeface="Consolas"/>
-                <a:cs typeface="Consolas"/>
-              </a:rPr>
+            </a:pPr>
+            <a:r>
+              <a:rPr lang="en" dirty="0"/>
               <a:t>@app.route('/login', methods=['GET', 'POST'])	</a:t>
             </a:r>
             <a:r>
@@ -5945,8 +5922,6 @@
                 <a:solidFill>
                   <a:srgbClr val="999999"/>
                 </a:solidFill>
-                <a:latin typeface="Consolas"/>
-                <a:cs typeface="Consolas"/>
               </a:rPr>
               <a:t># supports GET and POST</a:t>
             </a:r>
@@ -5958,10 +5933,7 @@
               </a:spcBef>
               <a:buNone/>
             </a:pPr>
-            <a:endParaRPr dirty="0">
-              <a:latin typeface="Consolas"/>
-              <a:cs typeface="Consolas"/>
-            </a:endParaRPr>
+            <a:endParaRPr dirty="0"/>
           </a:p>
         </p:txBody>
       </p:sp>
@@ -6065,14 +6037,15 @@
             </a:r>
           </a:p>
           <a:p>
-            <a:pPr marL="457200" lvl="0" indent="-228600" rtl="0">
+            <a:pPr marL="514350" lvl="0" indent="-285750" rtl="0">
               <a:lnSpc>
                 <a:spcPct val="100000"/>
               </a:lnSpc>
               <a:spcBef>
                 <a:spcPts val="0"/>
               </a:spcBef>
-              <a:buAutoNum type="arabicPeriod"/>
+              <a:buFont typeface="Arial"/>
+              <a:buChar char="•"/>
             </a:pPr>
             <a:r>
               <a:rPr lang="en" dirty="0"/>
@@ -6082,107 +6055,93 @@
               <a:rPr lang="en" dirty="0" smtClean="0"/>
               <a:t>page</a:t>
             </a:r>
-            <a:endParaRPr lang="en-US" dirty="0" smtClean="0"/>
-          </a:p>
-          <a:p>
-            <a:pPr marL="457200" lvl="0">
+          </a:p>
+          <a:p>
+            <a:pPr marL="457200" lvl="0" indent="0" rtl="0">
               <a:lnSpc>
                 <a:spcPct val="100000"/>
               </a:lnSpc>
+              <a:spcBef>
+                <a:spcPts val="0"/>
+              </a:spcBef>
               <a:spcAft>
                 <a:spcPts val="0"/>
               </a:spcAft>
-            </a:pPr>
-            <a:r>
-              <a:rPr lang="en" sz="1200" dirty="0">
-                <a:solidFill>
-                  <a:srgbClr val="000000"/>
-                </a:solidFill>
-                <a:latin typeface="Consolas"/>
-                <a:ea typeface="Source Code Pro"/>
-                <a:cs typeface="Consolas"/>
-                <a:sym typeface="Source Code Pro"/>
-              </a:rPr>
-              <a:t>@app.route('/cookies')                               </a:t>
-            </a:r>
-          </a:p>
-          <a:p>
-            <a:pPr marL="457200" lvl="0">
-              <a:lnSpc>
-                <a:spcPct val="100000"/>
-              </a:lnSpc>
-              <a:spcAft>
-                <a:spcPts val="0"/>
-              </a:spcAft>
-            </a:pPr>
-            <a:r>
-              <a:rPr lang="en" sz="1200" dirty="0">
-                <a:solidFill>
-                  <a:srgbClr val="000000"/>
-                </a:solidFill>
-                <a:latin typeface="Consolas"/>
-                <a:ea typeface="Source Code Pro"/>
-                <a:cs typeface="Consolas"/>
-                <a:sym typeface="Source Code Pro"/>
-              </a:rPr>
-              <a:t>def list_cookies_page(): </a:t>
-            </a:r>
-          </a:p>
-          <a:p>
-            <a:pPr marL="457200" lvl="0">
-              <a:spcAft>
-                <a:spcPts val="0"/>
-              </a:spcAft>
-            </a:pPr>
-            <a:r>
-              <a:rPr lang="en" sz="1200" dirty="0">
-                <a:solidFill>
-                  <a:srgbClr val="000000"/>
-                </a:solidFill>
-                <a:latin typeface="Consolas"/>
-                <a:ea typeface="Source Code Pro"/>
-                <a:cs typeface="Consolas"/>
-                <a:sym typeface="Source Code Pro"/>
-              </a:rPr>
-              <a:t>	return render_template('main.html', cookies=&lt;some data</a:t>
-            </a:r>
+              <a:buNone/>
+            </a:pPr>
             <a:r>
               <a:rPr lang="en" sz="1200" dirty="0" smtClean="0">
                 <a:solidFill>
                   <a:srgbClr val="000000"/>
                 </a:solidFill>
-                <a:latin typeface="Consolas"/>
+                <a:latin typeface="Source Code Pro"/>
                 <a:ea typeface="Source Code Pro"/>
-                <a:cs typeface="Consolas"/>
+                <a:cs typeface="Source Code Pro"/>
                 <a:sym typeface="Source Code Pro"/>
               </a:rPr>
-              <a:t>&gt;)</a:t>
-            </a:r>
-            <a:endParaRPr lang="en-US" sz="1200" dirty="0" smtClean="0">
-              <a:latin typeface="Consolas"/>
-              <a:cs typeface="Consolas"/>
-            </a:endParaRPr>
-          </a:p>
-          <a:p>
-            <a:pPr marL="457200" indent="-228600">
+              <a:t>@app.route('/cookies')                               </a:t>
+            </a:r>
+          </a:p>
+          <a:p>
+            <a:pPr marL="457200" lvl="0" indent="0" rtl="0">
               <a:lnSpc>
                 <a:spcPct val="100000"/>
               </a:lnSpc>
-              <a:buFont typeface="Open Sans"/>
-              <a:buAutoNum type="arabicPeriod"/>
-            </a:pPr>
-            <a:r>
-              <a:rPr lang="en" dirty="0"/>
-              <a:t>A route that handles data, but doesn’t load a </a:t>
-            </a:r>
-            <a:r>
-              <a:rPr lang="en" dirty="0" smtClean="0"/>
-              <a:t>page</a:t>
-            </a:r>
-            <a:endParaRPr lang="en-US" sz="1200" dirty="0" smtClean="0">
-              <a:solidFill>
-                <a:srgbClr val="000000"/>
-              </a:solidFill>
+              <a:spcBef>
+                <a:spcPts val="0"/>
+              </a:spcBef>
+              <a:spcAft>
+                <a:spcPts val="0"/>
+              </a:spcAft>
+              <a:buNone/>
+            </a:pPr>
+            <a:r>
+              <a:rPr lang="en" sz="1200" dirty="0" smtClean="0">
+                <a:solidFill>
+                  <a:srgbClr val="000000"/>
+                </a:solidFill>
+                <a:latin typeface="Source Code Pro"/>
+                <a:ea typeface="Source Code Pro"/>
+                <a:cs typeface="Source Code Pro"/>
+                <a:sym typeface="Source Code Pro"/>
+              </a:rPr>
+              <a:t>def list_cookies_page(): </a:t>
+            </a:r>
+          </a:p>
+          <a:p>
+            <a:pPr marL="457200" lvl="0" indent="0" rtl="0">
+              <a:spcBef>
+                <a:spcPts val="0"/>
+              </a:spcBef>
+              <a:spcAft>
+                <a:spcPts val="0"/>
+              </a:spcAft>
+              <a:buNone/>
+            </a:pPr>
+            <a:r>
+              <a:rPr lang="en" sz="1200" dirty="0" smtClean="0">
+                <a:solidFill>
+                  <a:srgbClr val="000000"/>
+                </a:solidFill>
+                <a:latin typeface="Source Code Pro"/>
+                <a:ea typeface="Source Code Pro"/>
+                <a:cs typeface="Source Code Pro"/>
+                <a:sym typeface="Source Code Pro"/>
+              </a:rPr>
+              <a:t>	return render_template('main.html', cookies=&lt;some data&gt;)</a:t>
+            </a:r>
+          </a:p>
+          <a:p>
+            <a:pPr marL="457200" lvl="0" indent="0" rtl="0">
+              <a:spcBef>
+                <a:spcPts val="0"/>
+              </a:spcBef>
+              <a:spcAft>
+                <a:spcPts val="0"/>
+              </a:spcAft>
+              <a:buNone/>
+            </a:pPr>
+            <a:endParaRPr sz="1200" dirty="0" smtClean="0">
               <a:latin typeface="Source Code Pro"/>
               <a:ea typeface="Source Code Pro"/>
               <a:cs typeface="Source Code Pro"/>
@@ -6190,6 +6149,19 @@
             </a:endParaRPr>
           </a:p>
           <a:p>
+            <a:pPr marL="514350" lvl="0" indent="-285750" rtl="0">
+              <a:spcBef>
+                <a:spcPts val="0"/>
+              </a:spcBef>
+              <a:buFont typeface="Arial"/>
+              <a:buChar char="•"/>
+            </a:pPr>
+            <a:r>
+              <a:rPr lang="en" dirty="0" smtClean="0"/>
+              <a:t>A route that handles data, but doesn’t load a page</a:t>
+            </a:r>
+          </a:p>
+          <a:p>
             <a:pPr marL="457200" lvl="0" indent="0" rtl="0">
               <a:lnSpc>
                 <a:spcPct val="100000"/>
@@ -6207,9 +6179,9 @@
                 <a:solidFill>
                   <a:srgbClr val="000000"/>
                 </a:solidFill>
-                <a:latin typeface="Consolas"/>
+                <a:latin typeface="Source Code Pro"/>
                 <a:ea typeface="Source Code Pro"/>
-                <a:cs typeface="Consolas"/>
+                <a:cs typeface="Source Code Pro"/>
                 <a:sym typeface="Source Code Pro"/>
               </a:rPr>
               <a:t>@app.route('/cookies')                               </a:t>
@@ -6233,24 +6205,12 @@
                 <a:solidFill>
                   <a:srgbClr val="000000"/>
                 </a:solidFill>
-                <a:latin typeface="Consolas"/>
+                <a:latin typeface="Source Code Pro"/>
                 <a:ea typeface="Source Code Pro"/>
-                <a:cs typeface="Consolas"/>
+                <a:cs typeface="Source Code Pro"/>
                 <a:sym typeface="Source Code Pro"/>
               </a:rPr>
-              <a:t>def </a:t>
-            </a:r>
-            <a:r>
-              <a:rPr lang="en" sz="1200" dirty="0">
-                <a:solidFill>
-                  <a:srgbClr val="000000"/>
-                </a:solidFill>
-                <a:latin typeface="Consolas"/>
-                <a:ea typeface="Source Code Pro"/>
-                <a:cs typeface="Consolas"/>
-                <a:sym typeface="Source Code Pro"/>
-              </a:rPr>
-              <a:t>get_cookies(): </a:t>
+              <a:t>def get_cookies(): </a:t>
             </a:r>
           </a:p>
           <a:p>
@@ -6267,13 +6227,13 @@
               <a:buNone/>
             </a:pPr>
             <a:r>
-              <a:rPr lang="en" sz="1200" dirty="0">
+              <a:rPr lang="en" sz="1200" dirty="0" smtClean="0">
                 <a:solidFill>
                   <a:srgbClr val="000000"/>
                 </a:solidFill>
-                <a:latin typeface="Consolas"/>
+                <a:latin typeface="Source Code Pro"/>
                 <a:ea typeface="Source Code Pro"/>
-                <a:cs typeface="Consolas"/>
+                <a:cs typeface="Source Code Pro"/>
                 <a:sym typeface="Source Code Pro"/>
               </a:rPr>
               <a:t>	return {“cookies”: [{“name”: “chocolate chip”}]}</a:t>
@@ -6408,9 +6368,6 @@
               <a:spcBef>
                 <a:spcPts val="0"/>
               </a:spcBef>
-              <a:spcAft>
-                <a:spcPts val="400"/>
-              </a:spcAft>
               <a:buFont typeface="Arial"/>
               <a:buChar char="•"/>
             </a:pPr>
@@ -6424,9 +6381,6 @@
               <a:spcBef>
                 <a:spcPts val="0"/>
               </a:spcBef>
-              <a:spcAft>
-                <a:spcPts val="400"/>
-              </a:spcAft>
               <a:buFont typeface="Arial"/>
               <a:buChar char="•"/>
             </a:pPr>
@@ -6440,9 +6394,6 @@
               <a:spcBef>
                 <a:spcPts val="0"/>
               </a:spcBef>
-              <a:spcAft>
-                <a:spcPts val="400"/>
-              </a:spcAft>
               <a:buFont typeface="Arial"/>
               <a:buChar char="•"/>
             </a:pPr>
@@ -6456,28 +6407,13 @@
               <a:spcBef>
                 <a:spcPts val="0"/>
               </a:spcBef>
-              <a:spcAft>
-                <a:spcPts val="400"/>
-              </a:spcAft>
               <a:buFont typeface="Arial"/>
               <a:buChar char="•"/>
             </a:pPr>
             <a:r>
               <a:rPr lang="en" dirty="0"/>
-              <a:t>DELETE: used to delete a </a:t>
-            </a:r>
-            <a:r>
-              <a:rPr lang="en" dirty="0" smtClean="0"/>
-              <a:t>resource</a:t>
-            </a:r>
-            <a:r>
-              <a:rPr lang="en-US" dirty="0" smtClean="0"/>
-              <a:t/>
-            </a:r>
-            <a:br>
-              <a:rPr lang="en-US" dirty="0" smtClean="0"/>
-            </a:br>
-            <a:endParaRPr lang="en-US" dirty="0" smtClean="0"/>
+              <a:t>DELETE: used to delete a resource</a:t>
+            </a:r>
           </a:p>
           <a:p>
             <a:pPr lvl="0" rtl="0">
@@ -6487,12 +6423,8 @@
               <a:buNone/>
             </a:pPr>
             <a:r>
-              <a:rPr lang="en" dirty="0" smtClean="0"/>
-              <a:t>Additionally</a:t>
-            </a:r>
-            <a:r>
               <a:rPr lang="en" dirty="0"/>
-              <a:t>, HTTP verbs will affect what the request looks like and how it behaves, but we won’t get into that for now.</a:t>
+              <a:t>Additionally, HTTP verbs will affect what the request looks like and how it behaves, but we won’t get into that for now.</a:t>
             </a:r>
           </a:p>
         </p:txBody>
@@ -6766,10 +6698,7 @@
               <a:buChar char="•"/>
             </a:pPr>
             <a:r>
-              <a:rPr lang="en" dirty="0">
-                <a:latin typeface="Consolas"/>
-                <a:cs typeface="Consolas"/>
-              </a:rPr>
+              <a:rPr lang="en" dirty="0"/>
               <a:t>GET /cow</a:t>
             </a:r>
           </a:p>
@@ -6782,10 +6711,7 @@
               <a:buChar char="•"/>
             </a:pPr>
             <a:r>
-              <a:rPr lang="en" dirty="0">
-                <a:latin typeface="Consolas"/>
-                <a:cs typeface="Consolas"/>
-              </a:rPr>
+              <a:rPr lang="en" dirty="0"/>
               <a:t>GET /cow/1</a:t>
             </a:r>
           </a:p>
@@ -6798,10 +6724,7 @@
               <a:buChar char="•"/>
             </a:pPr>
             <a:r>
-              <a:rPr lang="en" dirty="0">
-                <a:latin typeface="Consolas"/>
-                <a:cs typeface="Consolas"/>
-              </a:rPr>
+              <a:rPr lang="en" dirty="0"/>
               <a:t>PUT /cow/1</a:t>
             </a:r>
           </a:p>
@@ -6814,10 +6737,7 @@
               <a:buChar char="•"/>
             </a:pPr>
             <a:r>
-              <a:rPr lang="en" dirty="0">
-                <a:latin typeface="Consolas"/>
-                <a:cs typeface="Consolas"/>
-              </a:rPr>
+              <a:rPr lang="en" dirty="0"/>
               <a:t>POST /cow</a:t>
             </a:r>
           </a:p>
@@ -6830,10 +6750,7 @@
               <a:buChar char="•"/>
             </a:pPr>
             <a:r>
-              <a:rPr lang="en" dirty="0">
-                <a:latin typeface="Consolas"/>
-                <a:cs typeface="Consolas"/>
-              </a:rPr>
+              <a:rPr lang="en" dirty="0"/>
               <a:t>DELETE /cow/1</a:t>
             </a:r>
           </a:p>
@@ -6884,10 +6801,7 @@
               <a:buChar char="•"/>
             </a:pPr>
             <a:r>
-              <a:rPr lang="en" dirty="0">
-                <a:latin typeface="Consolas"/>
-                <a:cs typeface="Consolas"/>
-              </a:rPr>
+              <a:rPr lang="en" dirty="0"/>
               <a:t>GET /someCows</a:t>
             </a:r>
           </a:p>
@@ -6900,10 +6814,7 @@
               <a:buChar char="•"/>
             </a:pPr>
             <a:r>
-              <a:rPr lang="en" dirty="0">
-                <a:latin typeface="Consolas"/>
-                <a:cs typeface="Consolas"/>
-              </a:rPr>
+              <a:rPr lang="en" dirty="0"/>
               <a:t>GET /theCowNumbered1</a:t>
             </a:r>
           </a:p>
@@ -6916,10 +6827,7 @@
               <a:buChar char="•"/>
             </a:pPr>
             <a:r>
-              <a:rPr lang="en" dirty="0">
-                <a:latin typeface="Consolas"/>
-                <a:cs typeface="Consolas"/>
-              </a:rPr>
+              <a:rPr lang="en" dirty="0"/>
               <a:t>PUT /theCowNumbered1/update</a:t>
             </a:r>
           </a:p>
@@ -6932,10 +6840,7 @@
               <a:buChar char="•"/>
             </a:pPr>
             <a:r>
-              <a:rPr lang="en" dirty="0">
-                <a:latin typeface="Consolas"/>
-                <a:cs typeface="Consolas"/>
-              </a:rPr>
+              <a:rPr lang="en" dirty="0"/>
               <a:t>POST /createACow</a:t>
             </a:r>
           </a:p>
@@ -6948,10 +6853,7 @@
               <a:buChar char="•"/>
             </a:pPr>
             <a:r>
-              <a:rPr lang="en" dirty="0">
-                <a:latin typeface="Consolas"/>
-                <a:cs typeface="Consolas"/>
-              </a:rPr>
+              <a:rPr lang="en" dirty="0"/>
               <a:t>DELETE /cow/delete/1</a:t>
             </a:r>
           </a:p>
@@ -7440,21 +7342,21 @@
                 <a:solidFill>
                   <a:srgbClr val="000000"/>
                 </a:solidFill>
-                <a:latin typeface="Consolas"/>
+                <a:latin typeface="Source Code Pro"/>
                 <a:ea typeface="Source Code Pro"/>
-                <a:cs typeface="Consolas"/>
+                <a:cs typeface="Source Code Pro"/>
                 <a:sym typeface="Source Code Pro"/>
               </a:rPr>
-              <a:t>from flask import json, request	</a:t>
-            </a:r>
-            <a:r>
-              <a:rPr lang="en-US" sz="1200" dirty="0">
+              <a:t>from flask import json, request		</a:t>
+            </a:r>
+            <a:r>
+              <a:rPr lang="en-US" sz="1200" dirty="0" smtClean="0">
                 <a:solidFill>
                   <a:srgbClr val="000000"/>
                 </a:solidFill>
-                <a:latin typeface="Consolas"/>
+                <a:latin typeface="Source Code Pro"/>
                 <a:ea typeface="Source Code Pro"/>
-                <a:cs typeface="Consolas"/>
+                <a:cs typeface="Source Code Pro"/>
                 <a:sym typeface="Source Code Pro"/>
               </a:rPr>
               <a:t>	</a:t>
@@ -7464,9 +7366,9 @@
                 <a:solidFill>
                   <a:srgbClr val="999999"/>
                 </a:solidFill>
-                <a:latin typeface="Consolas"/>
+                <a:latin typeface="Source Code Pro"/>
                 <a:ea typeface="Source Code Pro"/>
-                <a:cs typeface="Consolas"/>
+                <a:cs typeface="Source Code Pro"/>
                 <a:sym typeface="Source Code Pro"/>
               </a:rPr>
               <a:t># </a:t>
@@ -7476,9 +7378,9 @@
                 <a:solidFill>
                   <a:srgbClr val="999999"/>
                 </a:solidFill>
-                <a:latin typeface="Consolas"/>
+                <a:latin typeface="Source Code Pro"/>
                 <a:ea typeface="Source Code Pro"/>
-                <a:cs typeface="Consolas"/>
+                <a:cs typeface="Source Code Pro"/>
                 <a:sym typeface="Source Code Pro"/>
               </a:rPr>
               <a:t>import the json and request libraries</a:t>
@@ -7496,9 +7398,9 @@
                 <a:solidFill>
                   <a:srgbClr val="999999"/>
                 </a:solidFill>
-                <a:latin typeface="Consolas"/>
+                <a:latin typeface="Source Code Pro"/>
                 <a:ea typeface="Source Code Pro"/>
-                <a:cs typeface="Consolas"/>
+                <a:cs typeface="Source Code Pro"/>
                 <a:sym typeface="Source Code Pro"/>
               </a:rPr>
               <a:t>...</a:t>
@@ -7522,9 +7424,9 @@
                 <a:solidFill>
                   <a:srgbClr val="000000"/>
                 </a:solidFill>
-                <a:latin typeface="Consolas"/>
+                <a:latin typeface="Source Code Pro"/>
                 <a:ea typeface="Source Code Pro"/>
-                <a:cs typeface="Consolas"/>
+                <a:cs typeface="Source Code Pro"/>
                 <a:sym typeface="Source Code Pro"/>
               </a:rPr>
               <a:t>@app.route('/cow', methods=['POST'])</a:t>
@@ -7548,9 +7450,9 @@
                 <a:solidFill>
                   <a:srgbClr val="000000"/>
                 </a:solidFill>
-                <a:latin typeface="Consolas"/>
+                <a:latin typeface="Source Code Pro"/>
                 <a:ea typeface="Source Code Pro"/>
-                <a:cs typeface="Consolas"/>
+                <a:cs typeface="Source Code Pro"/>
                 <a:sym typeface="Source Code Pro"/>
               </a:rPr>
               <a:t>def add_cow(): </a:t>
@@ -7571,21 +7473,65 @@
                 <a:solidFill>
                   <a:srgbClr val="000000"/>
                 </a:solidFill>
-                <a:latin typeface="Consolas"/>
+                <a:latin typeface="Source Code Pro"/>
                 <a:ea typeface="Source Code Pro"/>
-                <a:cs typeface="Consolas"/>
+                <a:cs typeface="Source Code Pro"/>
                 <a:sym typeface="Source Code Pro"/>
               </a:rPr>
-              <a:t>data = request.form		</a:t>
+              <a:t>data = request.form				</a:t>
+            </a:r>
+            <a:r>
+              <a:rPr lang="en" sz="1200" dirty="0">
+                <a:solidFill>
+                  <a:srgbClr val="999999"/>
+                </a:solidFill>
+                <a:latin typeface="Source Code Pro"/>
+                <a:ea typeface="Source Code Pro"/>
+                <a:cs typeface="Source Code Pro"/>
+                <a:sym typeface="Source Code Pro"/>
+              </a:rPr>
+              <a:t># grab the form data from the request</a:t>
+            </a:r>
+          </a:p>
+          <a:p>
+            <a:pPr marL="457200" lvl="0" indent="0" rtl="0">
+              <a:spcBef>
+                <a:spcPts val="0"/>
+              </a:spcBef>
+              <a:spcAft>
+                <a:spcPts val="0"/>
+              </a:spcAft>
+              <a:buNone/>
+            </a:pPr>
+            <a:r>
+              <a:rPr lang="en" sz="1200" dirty="0">
+                <a:solidFill>
+                  <a:srgbClr val="000000"/>
+                </a:solidFill>
+                <a:latin typeface="Source Code Pro"/>
+                <a:ea typeface="Source Code Pro"/>
+                <a:cs typeface="Source Code Pro"/>
+                <a:sym typeface="Source Code Pro"/>
+              </a:rPr>
+              <a:t>name = data['name']</a:t>
+            </a:r>
+            <a:r>
+              <a:rPr lang="en" sz="1200" dirty="0">
+                <a:latin typeface="Source Code Pro"/>
+                <a:ea typeface="Source Code Pro"/>
+                <a:cs typeface="Source Code Pro"/>
+                <a:sym typeface="Source Code Pro"/>
+              </a:rPr>
+              <a:t> 			</a:t>
             </a:r>
             <a:r>
               <a:rPr lang="en" sz="1200" dirty="0" smtClean="0">
                 <a:solidFill>
                   <a:srgbClr val="999999"/>
                 </a:solidFill>
-                <a:latin typeface="Consolas"/>
+                <a:latin typeface="Source Code Pro"/>
                 <a:ea typeface="Source Code Pro"/>
-                <a:cs typeface="Consolas"/>
+                <a:cs typeface="Source Code Pro"/>
                 <a:sym typeface="Source Code Pro"/>
               </a:rPr>
               <a:t># </a:t>
@@ -7595,12 +7541,12 @@
                 <a:solidFill>
                   <a:srgbClr val="999999"/>
                 </a:solidFill>
-                <a:latin typeface="Consolas"/>
+                <a:latin typeface="Source Code Pro"/>
                 <a:ea typeface="Source Code Pro"/>
-                <a:cs typeface="Consolas"/>
+                <a:cs typeface="Source Code Pro"/>
                 <a:sym typeface="Source Code Pro"/>
               </a:rPr>
-              <a:t>grab the form data from the request</a:t>
+              <a:t>the form data is a dictionary</a:t>
             </a:r>
           </a:p>
           <a:p>
@@ -7618,30 +7564,33 @@
                 <a:solidFill>
                   <a:srgbClr val="000000"/>
                 </a:solidFill>
-                <a:latin typeface="Consolas"/>
+                <a:latin typeface="Source Code Pro"/>
                 <a:ea typeface="Source Code Pro"/>
-                <a:cs typeface="Consolas"/>
+                <a:cs typeface="Source Code Pro"/>
                 <a:sym typeface="Source Code Pro"/>
               </a:rPr>
-              <a:t>name = data['name']</a:t>
-            </a:r>
-            <a:r>
-              <a:rPr lang="en" sz="1200" dirty="0">
-                <a:latin typeface="Consolas"/>
+              <a:t>return json.loads('{"message": "Added cow ' + name + '!"}') </a:t>
+            </a:r>
+            <a:r>
+              <a:rPr lang="en-US" sz="1200" dirty="0" smtClean="0">
+                <a:solidFill>
+                  <a:srgbClr val="000000"/>
+                </a:solidFill>
+                <a:latin typeface="Source Code Pro"/>
                 <a:ea typeface="Source Code Pro"/>
-                <a:cs typeface="Consolas"/>
+                <a:cs typeface="Source Code Pro"/>
                 <a:sym typeface="Source Code Pro"/>
               </a:rPr>
-              <a:t> 		</a:t>
+              <a:t>   </a:t>
             </a:r>
             <a:r>
               <a:rPr lang="en" sz="1200" dirty="0" smtClean="0">
                 <a:solidFill>
                   <a:srgbClr val="999999"/>
                 </a:solidFill>
-                <a:latin typeface="Consolas"/>
+                <a:latin typeface="Source Code Pro"/>
                 <a:ea typeface="Source Code Pro"/>
-                <a:cs typeface="Consolas"/>
+                <a:cs typeface="Source Code Pro"/>
                 <a:sym typeface="Source Code Pro"/>
               </a:rPr>
               <a:t># </a:t>
@@ -7651,47 +7600,12 @@
                 <a:solidFill>
                   <a:srgbClr val="999999"/>
                 </a:solidFill>
-                <a:latin typeface="Consolas"/>
+                <a:latin typeface="Source Code Pro"/>
                 <a:ea typeface="Source Code Pro"/>
-                <a:cs typeface="Consolas"/>
+                <a:cs typeface="Source Code Pro"/>
                 <a:sym typeface="Source Code Pro"/>
               </a:rPr>
-              <a:t>the form data is a dictionary</a:t>
-            </a:r>
-          </a:p>
-          <a:p>
-            <a:pPr marL="457200" lvl="0" indent="0" rtl="0">
-              <a:spcBef>
-                <a:spcPts val="0"/>
-              </a:spcBef>
-              <a:spcAft>
-                <a:spcPts val="0"/>
-              </a:spcAft>
-              <a:buNone/>
-            </a:pPr>
-            <a:r>
-              <a:rPr lang="en" sz="1200" dirty="0">
-                <a:solidFill>
-                  <a:srgbClr val="000000"/>
-                </a:solidFill>
-                <a:latin typeface="Consolas"/>
-                <a:ea typeface="Source Code Pro"/>
-                <a:cs typeface="Consolas"/>
-                <a:sym typeface="Source Code Pro"/>
-              </a:rPr>
-              <a:t>return json.dumps('{"message": "Added cow ' + name + '!"}') </a:t>
-            </a:r>
-            <a:r>
-              <a:rPr lang="en" sz="1200" dirty="0">
-                <a:solidFill>
-                  <a:srgbClr val="999999"/>
-                </a:solidFill>
-                <a:latin typeface="Consolas"/>
-                <a:ea typeface="Source Code Pro"/>
-                <a:cs typeface="Consolas"/>
-                <a:sym typeface="Source Code Pro"/>
-              </a:rPr>
-              <a:t># convert string to json</a:t>
+              <a:t>convert string to json</a:t>
             </a:r>
           </a:p>
           <a:p>
@@ -7701,10 +7615,7 @@
               </a:spcBef>
               <a:buNone/>
             </a:pPr>
-            <a:endParaRPr dirty="0">
-              <a:latin typeface="Consolas"/>
-              <a:cs typeface="Consolas"/>
-            </a:endParaRPr>
+            <a:endParaRPr dirty="0"/>
           </a:p>
         </p:txBody>
       </p:sp>

</xml_diff>

<commit_message>
Added Windows commands for lectures
</commit_message>
<xml_diff>
--- a/Week_4/Lectures/4.3_Flask_Part_2.pptx
+++ b/Week_4/Lectures/4.3_Flask_Part_2.pptx
@@ -388,7 +388,7 @@
     </p:spTree>
     <p:extLst>
       <p:ext uri="{BB962C8B-B14F-4D97-AF65-F5344CB8AC3E}">
-        <p14:creationId xmlns:p14="http://schemas.microsoft.com/office/powerpoint/2010/main" val="594248413"/>
+        <p14:creationId xmlns:p14="http://schemas.microsoft.com/office/powerpoint/2010/main" val="517394616"/>
       </p:ext>
     </p:extLst>
   </p:cSld>
@@ -1456,7 +1456,7 @@
         </p:nvSpPr>
         <p:spPr>
           <a:xfrm>
-            <a:off x="381000" y="685800"/>
+            <a:off x="381300" y="685800"/>
             <a:ext cx="6096000" cy="3429000"/>
           </a:xfrm>
           <a:custGeom>
@@ -5852,16 +5852,26 @@
               <a:spcAft>
                 <a:spcPts val="0"/>
               </a:spcAft>
-            </a:pPr>
-            <a:r>
-              <a:rPr lang="en" dirty="0"/>
-              <a:t>@app.route('/hello')			</a:t>
+              <a:buFont typeface="Consolas"/>
+            </a:pPr>
+            <a:r>
+              <a:rPr lang="en" dirty="0">
+                <a:latin typeface="Consolas"/>
+                <a:ea typeface="Consolas"/>
+                <a:cs typeface="Consolas"/>
+                <a:sym typeface="Consolas"/>
+              </a:rPr>
+              <a:t>@app.route('/hello')				</a:t>
             </a:r>
             <a:r>
               <a:rPr lang="en" dirty="0" smtClean="0">
                 <a:solidFill>
                   <a:srgbClr val="999999"/>
                 </a:solidFill>
+                <a:latin typeface="Consolas"/>
+                <a:ea typeface="Consolas"/>
+                <a:cs typeface="Consolas"/>
+                <a:sym typeface="Consolas"/>
               </a:rPr>
               <a:t># </a:t>
             </a:r>
@@ -5870,6 +5880,10 @@
                 <a:solidFill>
                   <a:srgbClr val="999999"/>
                 </a:solidFill>
+                <a:latin typeface="Consolas"/>
+                <a:ea typeface="Consolas"/>
+                <a:cs typeface="Consolas"/>
+                <a:sym typeface="Consolas"/>
               </a:rPr>
               <a:t>defaults to GET</a:t>
             </a:r>
@@ -5882,9 +5896,15 @@
               <a:spcAft>
                 <a:spcPts val="0"/>
               </a:spcAft>
-            </a:pPr>
-            <a:r>
-              <a:rPr lang="en" dirty="0"/>
+              <a:buFont typeface="Consolas"/>
+            </a:pPr>
+            <a:r>
+              <a:rPr lang="en" dirty="0">
+                <a:latin typeface="Consolas"/>
+                <a:ea typeface="Consolas"/>
+                <a:cs typeface="Consolas"/>
+                <a:sym typeface="Consolas"/>
+              </a:rPr>
               <a:t>@app.route('/user/bob', methods=['GET'])	</a:t>
             </a:r>
             <a:r>
@@ -5892,6 +5912,10 @@
                 <a:solidFill>
                   <a:srgbClr val="999999"/>
                 </a:solidFill>
+                <a:latin typeface="Consolas"/>
+                <a:ea typeface="Consolas"/>
+                <a:cs typeface="Consolas"/>
+                <a:sym typeface="Consolas"/>
               </a:rPr>
               <a:t># </a:t>
             </a:r>
@@ -5900,6 +5924,10 @@
                 <a:solidFill>
                   <a:srgbClr val="999999"/>
                 </a:solidFill>
+                <a:latin typeface="Consolas"/>
+                <a:ea typeface="Consolas"/>
+                <a:cs typeface="Consolas"/>
+                <a:sym typeface="Consolas"/>
               </a:rPr>
               <a:t>supports GET only</a:t>
             </a:r>
@@ -5912,9 +5940,15 @@
               <a:spcAft>
                 <a:spcPts val="0"/>
               </a:spcAft>
-            </a:pPr>
-            <a:r>
-              <a:rPr lang="en" dirty="0"/>
+              <a:buFont typeface="Consolas"/>
+            </a:pPr>
+            <a:r>
+              <a:rPr lang="en" dirty="0">
+                <a:latin typeface="Consolas"/>
+                <a:ea typeface="Consolas"/>
+                <a:cs typeface="Consolas"/>
+                <a:sym typeface="Consolas"/>
+              </a:rPr>
               <a:t>@app.route('/login', methods=['GET', 'POST'])	</a:t>
             </a:r>
             <a:r>
@@ -5922,6 +5956,10 @@
                 <a:solidFill>
                   <a:srgbClr val="999999"/>
                 </a:solidFill>
+                <a:latin typeface="Consolas"/>
+                <a:ea typeface="Consolas"/>
+                <a:cs typeface="Consolas"/>
+                <a:sym typeface="Consolas"/>
               </a:rPr>
               <a:t># supports GET and POST</a:t>
             </a:r>
@@ -6049,11 +6087,7 @@
             </a:pPr>
             <a:r>
               <a:rPr lang="en" dirty="0"/>
-              <a:t>A route that loads a </a:t>
-            </a:r>
-            <a:r>
-              <a:rPr lang="en" dirty="0" smtClean="0"/>
-              <a:t>page</a:t>
+              <a:t>A route that loads a page</a:t>
             </a:r>
           </a:p>
           <a:p>
@@ -6070,14 +6104,14 @@
               <a:buNone/>
             </a:pPr>
             <a:r>
-              <a:rPr lang="en" sz="1200" dirty="0" smtClean="0">
+              <a:rPr lang="en" sz="1200" dirty="0">
                 <a:solidFill>
                   <a:srgbClr val="000000"/>
                 </a:solidFill>
-                <a:latin typeface="Source Code Pro"/>
-                <a:ea typeface="Source Code Pro"/>
-                <a:cs typeface="Source Code Pro"/>
-                <a:sym typeface="Source Code Pro"/>
+                <a:latin typeface="Consolas"/>
+                <a:ea typeface="Consolas"/>
+                <a:cs typeface="Consolas"/>
+                <a:sym typeface="Consolas"/>
               </a:rPr>
               <a:t>@app.route('/cookies')                               </a:t>
             </a:r>
@@ -6096,14 +6130,14 @@
               <a:buNone/>
             </a:pPr>
             <a:r>
-              <a:rPr lang="en" sz="1200" dirty="0" smtClean="0">
+              <a:rPr lang="en" sz="1200" dirty="0">
                 <a:solidFill>
                   <a:srgbClr val="000000"/>
                 </a:solidFill>
-                <a:latin typeface="Source Code Pro"/>
-                <a:ea typeface="Source Code Pro"/>
-                <a:cs typeface="Source Code Pro"/>
-                <a:sym typeface="Source Code Pro"/>
+                <a:latin typeface="Consolas"/>
+                <a:ea typeface="Consolas"/>
+                <a:cs typeface="Consolas"/>
+                <a:sym typeface="Consolas"/>
               </a:rPr>
               <a:t>def list_cookies_page(): </a:t>
             </a:r>
@@ -6119,14 +6153,14 @@
               <a:buNone/>
             </a:pPr>
             <a:r>
-              <a:rPr lang="en" sz="1200" dirty="0" smtClean="0">
+              <a:rPr lang="en" sz="1200" dirty="0">
                 <a:solidFill>
                   <a:srgbClr val="000000"/>
                 </a:solidFill>
-                <a:latin typeface="Source Code Pro"/>
-                <a:ea typeface="Source Code Pro"/>
-                <a:cs typeface="Source Code Pro"/>
-                <a:sym typeface="Source Code Pro"/>
+                <a:latin typeface="Consolas"/>
+                <a:ea typeface="Consolas"/>
+                <a:cs typeface="Consolas"/>
+                <a:sym typeface="Consolas"/>
               </a:rPr>
               <a:t>	return render_template('main.html', cookies=&lt;some data&gt;)</a:t>
             </a:r>
@@ -6141,7 +6175,7 @@
               </a:spcAft>
               <a:buNone/>
             </a:pPr>
-            <a:endParaRPr sz="1200" dirty="0" smtClean="0">
+            <a:endParaRPr sz="1200" dirty="0">
               <a:latin typeface="Source Code Pro"/>
               <a:ea typeface="Source Code Pro"/>
               <a:cs typeface="Source Code Pro"/>
@@ -6157,7 +6191,7 @@
               <a:buChar char="•"/>
             </a:pPr>
             <a:r>
-              <a:rPr lang="en" dirty="0" smtClean="0"/>
+              <a:rPr lang="en" dirty="0"/>
               <a:t>A route that handles data, but doesn’t load a page</a:t>
             </a:r>
           </a:p>
@@ -6175,14 +6209,14 @@
               <a:buNone/>
             </a:pPr>
             <a:r>
-              <a:rPr lang="en" sz="1200" dirty="0" smtClean="0">
+              <a:rPr lang="en" sz="1200" dirty="0">
                 <a:solidFill>
                   <a:srgbClr val="000000"/>
                 </a:solidFill>
-                <a:latin typeface="Source Code Pro"/>
-                <a:ea typeface="Source Code Pro"/>
-                <a:cs typeface="Source Code Pro"/>
-                <a:sym typeface="Source Code Pro"/>
+                <a:latin typeface="Consolas"/>
+                <a:ea typeface="Consolas"/>
+                <a:cs typeface="Consolas"/>
+                <a:sym typeface="Consolas"/>
               </a:rPr>
               <a:t>@app.route('/cookies')                               </a:t>
             </a:r>
@@ -6201,14 +6235,14 @@
               <a:buNone/>
             </a:pPr>
             <a:r>
-              <a:rPr lang="en" sz="1200" dirty="0" smtClean="0">
+              <a:rPr lang="en" sz="1200" dirty="0">
                 <a:solidFill>
                   <a:srgbClr val="000000"/>
                 </a:solidFill>
-                <a:latin typeface="Source Code Pro"/>
-                <a:ea typeface="Source Code Pro"/>
-                <a:cs typeface="Source Code Pro"/>
-                <a:sym typeface="Source Code Pro"/>
+                <a:latin typeface="Consolas"/>
+                <a:ea typeface="Consolas"/>
+                <a:cs typeface="Consolas"/>
+                <a:sym typeface="Consolas"/>
               </a:rPr>
               <a:t>def get_cookies(): </a:t>
             </a:r>
@@ -6227,37 +6261,37 @@
               <a:buNone/>
             </a:pPr>
             <a:r>
-              <a:rPr lang="en" sz="1200" dirty="0" smtClean="0">
-                <a:solidFill>
-                  <a:srgbClr val="000000"/>
-                </a:solidFill>
-                <a:latin typeface="Source Code Pro"/>
-                <a:ea typeface="Source Code Pro"/>
-                <a:cs typeface="Source Code Pro"/>
-                <a:sym typeface="Source Code Pro"/>
-              </a:rPr>
-              <a:t>	return {“cookies”: [{“name”: “chocolate chip”}]}</a:t>
-            </a:r>
-          </a:p>
-          <a:p>
-            <a:pPr marL="457200" lvl="0" indent="0" rtl="0">
-              <a:spcBef>
-                <a:spcPts val="0"/>
-              </a:spcBef>
-              <a:spcAft>
-                <a:spcPts val="0"/>
-              </a:spcAft>
-              <a:buNone/>
-            </a:pPr>
-            <a:r>
               <a:rPr lang="en" sz="1200" dirty="0">
                 <a:solidFill>
                   <a:srgbClr val="000000"/>
                 </a:solidFill>
-                <a:latin typeface="Source Code Pro"/>
-                <a:ea typeface="Source Code Pro"/>
-                <a:cs typeface="Source Code Pro"/>
-                <a:sym typeface="Source Code Pro"/>
+                <a:latin typeface="Consolas"/>
+                <a:ea typeface="Consolas"/>
+                <a:cs typeface="Consolas"/>
+                <a:sym typeface="Consolas"/>
+              </a:rPr>
+              <a:t>	return {“cookies”: [{“name”: “chocolate chip”}]}</a:t>
+            </a:r>
+          </a:p>
+          <a:p>
+            <a:pPr marL="457200" lvl="0" indent="0" rtl="0">
+              <a:spcBef>
+                <a:spcPts val="0"/>
+              </a:spcBef>
+              <a:spcAft>
+                <a:spcPts val="0"/>
+              </a:spcAft>
+              <a:buNone/>
+            </a:pPr>
+            <a:r>
+              <a:rPr lang="en" sz="1200" dirty="0">
+                <a:solidFill>
+                  <a:srgbClr val="000000"/>
+                </a:solidFill>
+                <a:latin typeface="Consolas"/>
+                <a:ea typeface="Consolas"/>
+                <a:cs typeface="Consolas"/>
+                <a:sym typeface="Consolas"/>
               </a:rPr>
               <a:t>	</a:t>
             </a:r>
@@ -7326,7 +7360,7 @@
               <a:buNone/>
             </a:pPr>
             <a:r>
-              <a:rPr lang="en" dirty="0"/>
+              <a:rPr lang="en"/>
               <a:t>As we saw earlier, PUT and POST requests expect data from the request body. How do we grab that data and interact with it? Like so:</a:t>
             </a:r>
           </a:p>
@@ -7338,70 +7372,46 @@
               <a:buNone/>
             </a:pPr>
             <a:r>
-              <a:rPr lang="en" sz="1200" dirty="0">
+              <a:rPr lang="en" sz="1200">
                 <a:solidFill>
                   <a:srgbClr val="000000"/>
                 </a:solidFill>
-                <a:latin typeface="Source Code Pro"/>
-                <a:ea typeface="Source Code Pro"/>
-                <a:cs typeface="Source Code Pro"/>
-                <a:sym typeface="Source Code Pro"/>
+                <a:latin typeface="Consolas"/>
+                <a:ea typeface="Consolas"/>
+                <a:cs typeface="Consolas"/>
+                <a:sym typeface="Consolas"/>
               </a:rPr>
-              <a:t>from flask import json, request		</a:t>
-            </a:r>
-            <a:r>
-              <a:rPr lang="en-US" sz="1200" dirty="0" smtClean="0">
-                <a:solidFill>
-                  <a:srgbClr val="000000"/>
-                </a:solidFill>
-                <a:latin typeface="Source Code Pro"/>
-                <a:ea typeface="Source Code Pro"/>
-                <a:cs typeface="Source Code Pro"/>
-                <a:sym typeface="Source Code Pro"/>
-              </a:rPr>
-              <a:t>	</a:t>
-            </a:r>
-            <a:r>
-              <a:rPr lang="en" sz="1200" dirty="0" smtClean="0">
+              <a:t>from flask import json, request		     </a:t>
+            </a:r>
+            <a:r>
+              <a:rPr lang="en" sz="1200">
                 <a:solidFill>
                   <a:srgbClr val="999999"/>
                 </a:solidFill>
-                <a:latin typeface="Source Code Pro"/>
-                <a:ea typeface="Source Code Pro"/>
-                <a:cs typeface="Source Code Pro"/>
-                <a:sym typeface="Source Code Pro"/>
+                <a:latin typeface="Consolas"/>
+                <a:ea typeface="Consolas"/>
+                <a:cs typeface="Consolas"/>
+                <a:sym typeface="Consolas"/>
               </a:rPr>
-              <a:t># </a:t>
-            </a:r>
-            <a:r>
-              <a:rPr lang="en" sz="1200" dirty="0">
+              <a:t># import the json and request libraries</a:t>
+            </a:r>
+          </a:p>
+          <a:p>
+            <a:pPr lvl="0">
+              <a:spcBef>
+                <a:spcPts val="0"/>
+              </a:spcBef>
+              <a:buNone/>
+            </a:pPr>
+            <a:r>
+              <a:rPr lang="en" sz="1200">
                 <a:solidFill>
                   <a:srgbClr val="999999"/>
                 </a:solidFill>
-                <a:latin typeface="Source Code Pro"/>
-                <a:ea typeface="Source Code Pro"/>
-                <a:cs typeface="Source Code Pro"/>
-                <a:sym typeface="Source Code Pro"/>
-              </a:rPr>
-              <a:t>import the json and request libraries</a:t>
-            </a:r>
-          </a:p>
-          <a:p>
-            <a:pPr lvl="0">
-              <a:spcBef>
-                <a:spcPts val="0"/>
-              </a:spcBef>
-              <a:buNone/>
-            </a:pPr>
-            <a:r>
-              <a:rPr lang="en" sz="1200" dirty="0">
-                <a:solidFill>
-                  <a:srgbClr val="999999"/>
-                </a:solidFill>
-                <a:latin typeface="Source Code Pro"/>
-                <a:ea typeface="Source Code Pro"/>
-                <a:cs typeface="Source Code Pro"/>
-                <a:sym typeface="Source Code Pro"/>
+                <a:latin typeface="Consolas"/>
+                <a:ea typeface="Consolas"/>
+                <a:cs typeface="Consolas"/>
+                <a:sym typeface="Consolas"/>
               </a:rPr>
               <a:t>...</a:t>
             </a:r>
@@ -7420,14 +7430,14 @@
               <a:buNone/>
             </a:pPr>
             <a:r>
-              <a:rPr lang="en" sz="1200" dirty="0">
+              <a:rPr lang="en" sz="1200">
                 <a:solidFill>
                   <a:srgbClr val="000000"/>
                 </a:solidFill>
-                <a:latin typeface="Source Code Pro"/>
-                <a:ea typeface="Source Code Pro"/>
-                <a:cs typeface="Source Code Pro"/>
-                <a:sym typeface="Source Code Pro"/>
+                <a:latin typeface="Consolas"/>
+                <a:ea typeface="Consolas"/>
+                <a:cs typeface="Consolas"/>
+                <a:sym typeface="Consolas"/>
               </a:rPr>
               <a:t>@app.route('/cow', methods=['POST'])</a:t>
             </a:r>
@@ -7446,14 +7456,14 @@
               <a:buNone/>
             </a:pPr>
             <a:r>
-              <a:rPr lang="en" sz="1200" dirty="0">
+              <a:rPr lang="en" sz="1200">
                 <a:solidFill>
                   <a:srgbClr val="000000"/>
                 </a:solidFill>
-                <a:latin typeface="Source Code Pro"/>
-                <a:ea typeface="Source Code Pro"/>
-                <a:cs typeface="Source Code Pro"/>
-                <a:sym typeface="Source Code Pro"/>
+                <a:latin typeface="Consolas"/>
+                <a:ea typeface="Consolas"/>
+                <a:cs typeface="Consolas"/>
+                <a:sym typeface="Consolas"/>
               </a:rPr>
               <a:t>def add_cow(): </a:t>
             </a:r>
@@ -7469,26 +7479,26 @@
               <a:buNone/>
             </a:pPr>
             <a:r>
-              <a:rPr lang="en" sz="1200" dirty="0">
+              <a:rPr lang="en" sz="1200">
                 <a:solidFill>
                   <a:srgbClr val="000000"/>
                 </a:solidFill>
-                <a:latin typeface="Source Code Pro"/>
-                <a:ea typeface="Source Code Pro"/>
-                <a:cs typeface="Source Code Pro"/>
-                <a:sym typeface="Source Code Pro"/>
+                <a:latin typeface="Consolas"/>
+                <a:ea typeface="Consolas"/>
+                <a:cs typeface="Consolas"/>
+                <a:sym typeface="Consolas"/>
               </a:rPr>
               <a:t>data = request.form				</a:t>
             </a:r>
             <a:r>
-              <a:rPr lang="en" sz="1200" dirty="0">
+              <a:rPr lang="en" sz="1200">
                 <a:solidFill>
                   <a:srgbClr val="999999"/>
                 </a:solidFill>
-                <a:latin typeface="Source Code Pro"/>
-                <a:ea typeface="Source Code Pro"/>
-                <a:cs typeface="Source Code Pro"/>
-                <a:sym typeface="Source Code Pro"/>
+                <a:latin typeface="Consolas"/>
+                <a:ea typeface="Consolas"/>
+                <a:cs typeface="Consolas"/>
+                <a:sym typeface="Consolas"/>
               </a:rPr>
               <a:t># grab the form data from the request</a:t>
             </a:r>
@@ -7504,108 +7514,72 @@
               <a:buNone/>
             </a:pPr>
             <a:r>
-              <a:rPr lang="en" sz="1200" dirty="0">
+              <a:rPr lang="en" sz="1200">
                 <a:solidFill>
                   <a:srgbClr val="000000"/>
                 </a:solidFill>
-                <a:latin typeface="Source Code Pro"/>
-                <a:ea typeface="Source Code Pro"/>
-                <a:cs typeface="Source Code Pro"/>
-                <a:sym typeface="Source Code Pro"/>
+                <a:latin typeface="Consolas"/>
+                <a:ea typeface="Consolas"/>
+                <a:cs typeface="Consolas"/>
+                <a:sym typeface="Consolas"/>
               </a:rPr>
               <a:t>name = data['name']</a:t>
             </a:r>
             <a:r>
-              <a:rPr lang="en" sz="1200" dirty="0">
-                <a:latin typeface="Source Code Pro"/>
-                <a:ea typeface="Source Code Pro"/>
-                <a:cs typeface="Source Code Pro"/>
-                <a:sym typeface="Source Code Pro"/>
+              <a:rPr lang="en" sz="1200">
+                <a:latin typeface="Consolas"/>
+                <a:ea typeface="Consolas"/>
+                <a:cs typeface="Consolas"/>
+                <a:sym typeface="Consolas"/>
               </a:rPr>
-              <a:t> 			</a:t>
-            </a:r>
-            <a:r>
-              <a:rPr lang="en" sz="1200" dirty="0" smtClean="0">
+              <a:t> 				</a:t>
+            </a:r>
+            <a:r>
+              <a:rPr lang="en" sz="1200">
                 <a:solidFill>
                   <a:srgbClr val="999999"/>
                 </a:solidFill>
-                <a:latin typeface="Source Code Pro"/>
-                <a:ea typeface="Source Code Pro"/>
-                <a:cs typeface="Source Code Pro"/>
-                <a:sym typeface="Source Code Pro"/>
+                <a:latin typeface="Consolas"/>
+                <a:ea typeface="Consolas"/>
+                <a:cs typeface="Consolas"/>
+                <a:sym typeface="Consolas"/>
               </a:rPr>
-              <a:t># </a:t>
-            </a:r>
-            <a:r>
-              <a:rPr lang="en" sz="1200" dirty="0">
+              <a:t># the form data is a dictionary</a:t>
+            </a:r>
+          </a:p>
+          <a:p>
+            <a:pPr marL="457200" lvl="0" indent="0" rtl="0">
+              <a:spcBef>
+                <a:spcPts val="0"/>
+              </a:spcBef>
+              <a:spcAft>
+                <a:spcPts val="0"/>
+              </a:spcAft>
+              <a:buNone/>
+            </a:pPr>
+            <a:r>
+              <a:rPr lang="en" sz="1200">
+                <a:solidFill>
+                  <a:srgbClr val="000000"/>
+                </a:solidFill>
+                <a:latin typeface="Consolas"/>
+                <a:ea typeface="Consolas"/>
+                <a:cs typeface="Consolas"/>
+                <a:sym typeface="Consolas"/>
+              </a:rPr>
+              <a:t>return json.loads('{"message": "Added cow ' + name + '!"}') </a:t>
+            </a:r>
+            <a:r>
+              <a:rPr lang="en" sz="1200">
                 <a:solidFill>
                   <a:srgbClr val="999999"/>
                 </a:solidFill>
-                <a:latin typeface="Source Code Pro"/>
-                <a:ea typeface="Source Code Pro"/>
-                <a:cs typeface="Source Code Pro"/>
-                <a:sym typeface="Source Code Pro"/>
+                <a:latin typeface="Consolas"/>
+                <a:ea typeface="Consolas"/>
+                <a:cs typeface="Consolas"/>
+                <a:sym typeface="Consolas"/>
               </a:rPr>
-              <a:t>the form data is a dictionary</a:t>
-            </a:r>
-          </a:p>
-          <a:p>
-            <a:pPr marL="457200" lvl="0" indent="0" rtl="0">
-              <a:spcBef>
-                <a:spcPts val="0"/>
-              </a:spcBef>
-              <a:spcAft>
-                <a:spcPts val="0"/>
-              </a:spcAft>
-              <a:buNone/>
-            </a:pPr>
-            <a:r>
-              <a:rPr lang="en" sz="1200" dirty="0">
-                <a:solidFill>
-                  <a:srgbClr val="000000"/>
-                </a:solidFill>
-                <a:latin typeface="Source Code Pro"/>
-                <a:ea typeface="Source Code Pro"/>
-                <a:cs typeface="Source Code Pro"/>
-                <a:sym typeface="Source Code Pro"/>
-              </a:rPr>
-              <a:t>return json.loads('{"message": "Added cow ' + name + '!"}') </a:t>
-            </a:r>
-            <a:r>
-              <a:rPr lang="en-US" sz="1200" dirty="0" smtClean="0">
-                <a:solidFill>
-                  <a:srgbClr val="000000"/>
-                </a:solidFill>
-                <a:latin typeface="Source Code Pro"/>
-                <a:ea typeface="Source Code Pro"/>
-                <a:cs typeface="Source Code Pro"/>
-                <a:sym typeface="Source Code Pro"/>
-              </a:rPr>
-              <a:t>   </a:t>
-            </a:r>
-            <a:r>
-              <a:rPr lang="en" sz="1200" dirty="0" smtClean="0">
-                <a:solidFill>
-                  <a:srgbClr val="999999"/>
-                </a:solidFill>
-                <a:latin typeface="Source Code Pro"/>
-                <a:ea typeface="Source Code Pro"/>
-                <a:cs typeface="Source Code Pro"/>
-                <a:sym typeface="Source Code Pro"/>
-              </a:rPr>
-              <a:t># </a:t>
-            </a:r>
-            <a:r>
-              <a:rPr lang="en" sz="1200" dirty="0">
-                <a:solidFill>
-                  <a:srgbClr val="999999"/>
-                </a:solidFill>
-                <a:latin typeface="Source Code Pro"/>
-                <a:ea typeface="Source Code Pro"/>
-                <a:cs typeface="Source Code Pro"/>
-                <a:sym typeface="Source Code Pro"/>
-              </a:rPr>
-              <a:t>convert string to json</a:t>
+              <a:t># convert string to json</a:t>
             </a:r>
           </a:p>
           <a:p>
@@ -7615,7 +7589,7 @@
               </a:spcBef>
               <a:buNone/>
             </a:pPr>
-            <a:endParaRPr dirty="0"/>
+            <a:endParaRPr/>
           </a:p>
         </p:txBody>
       </p:sp>

</xml_diff>